<commit_message>
small change in ppt
</commit_message>
<xml_diff>
--- a/Collocation-Extraction-Using-Amazon-Elastic-Map-Reduce.pptx
+++ b/Collocation-Extraction-Using-Amazon-Elastic-Map-Reduce.pptx
@@ -4014,7 +4014,7 @@
         <p:spPr>
           <a:xfrm>
             <a:off x="611560" y="1340768"/>
-            <a:ext cx="7920880" cy="5232202"/>
+            <a:ext cx="7920880" cy="5016758"/>
           </a:xfrm>
           <a:prstGeom prst="rect">
             <a:avLst/>
@@ -4145,6 +4145,10 @@
               <a:t>() so the information gets to the reducer sorted by </a:t>
             </a:r>
             <a:r>
+              <a:rPr lang="en-US" sz="1400" i="1" dirty="0" smtClean="0"/>
+              <a:t>decade, </a:t>
+            </a:r>
+            <a:r>
               <a:rPr lang="en-US" sz="1400" i="1" dirty="0" err="1" smtClean="0"/>
               <a:t>firstWord</a:t>
             </a:r>
@@ -4158,19 +4162,8 @@
             </a:r>
             <a:r>
               <a:rPr lang="en-US" sz="1400" i="1" dirty="0" smtClean="0"/>
-              <a:t>, </a:t>
-            </a:r>
-            <a:endParaRPr lang="he-IL" sz="1400" i="1" dirty="0" smtClean="0"/>
-          </a:p>
-          <a:p>
-            <a:pPr algn="l"/>
-            <a:r>
-              <a:rPr lang="en-US" sz="1400" i="1" dirty="0" smtClean="0"/>
-              <a:t>decade.</a:t>
-            </a:r>
-          </a:p>
-          <a:p>
-            <a:pPr algn="l"/>
+              <a:t>.</a:t>
+            </a:r>
             <a:endParaRPr lang="en-US" sz="1400" i="1" dirty="0" smtClean="0"/>
           </a:p>
           <a:p>
@@ -4432,6 +4425,10 @@
               <a:t>() so the information gets to the reducer sorted by </a:t>
             </a:r>
             <a:r>
+              <a:rPr lang="en-US" sz="1400" i="1" dirty="0" smtClean="0"/>
+              <a:t>decade, </a:t>
+            </a:r>
+            <a:r>
               <a:rPr lang="en-US" sz="1400" i="1" dirty="0" err="1" smtClean="0"/>
               <a:t>firstWord</a:t>
             </a:r>
@@ -4445,16 +4442,9 @@
             </a:r>
             <a:r>
               <a:rPr lang="en-US" sz="1400" i="1" dirty="0" smtClean="0"/>
-              <a:t>, </a:t>
-            </a:r>
-            <a:endParaRPr lang="he-IL" sz="1400" i="1" dirty="0" smtClean="0"/>
-          </a:p>
-          <a:p>
-            <a:pPr algn="l"/>
-            <a:r>
-              <a:rPr lang="en-US" sz="1400" i="1" dirty="0" smtClean="0"/>
-              <a:t>decade.</a:t>
-            </a:r>
+              <a:t>.</a:t>
+            </a:r>
+            <a:endParaRPr lang="en-US" sz="1400" i="1" dirty="0" smtClean="0"/>
           </a:p>
           <a:p>
             <a:pPr algn="l"/>

</xml_diff>